<commit_message>
fixed error in doc
</commit_message>
<xml_diff>
--- a/doc/Shutter Plug Moqup.pptx
+++ b/doc/Shutter Plug Moqup.pptx
@@ -108,6 +108,11 @@
       </a:defRPr>
     </a:lvl9pPr>
   </p:defaultTextStyle>
+  <p:extLst>
+    <p:ext uri="{EFAFB233-063F-42B5-8137-9DF3F51BA10A}">
+      <p15:sldGuideLst xmlns:p15="http://schemas.microsoft.com/office/powerpoint/2012/main"/>
+    </p:ext>
+  </p:extLst>
 </p:presentation>
 </file>
 
@@ -3451,10 +3456,10 @@
       </p:sp>
       <p:pic>
         <p:nvPicPr>
-          <p:cNvPr id="5" name="Content Placeholder 4">
-            <a:extLst>
-              <a:ext uri="{FF2B5EF4-FFF2-40B4-BE49-F238E27FC236}">
-                <a16:creationId xmlns:a16="http://schemas.microsoft.com/office/drawing/2014/main" id="{F6B12BB2-4760-4CD4-942A-CB398613D09D}"/>
+          <p:cNvPr id="7" name="Content Placeholder 6">
+            <a:extLst>
+              <a:ext uri="{FF2B5EF4-FFF2-40B4-BE49-F238E27FC236}">
+                <a16:creationId xmlns:a16="http://schemas.microsoft.com/office/drawing/2014/main" id="{807DBB7E-0770-40D5-9AD9-B30FA59CD9C1}"/>
               </a:ext>
             </a:extLst>
           </p:cNvPr>
@@ -3479,8 +3484,8 @@
         </p:blipFill>
         <p:spPr>
           <a:xfrm>
-            <a:off x="3895782" y="1825625"/>
-            <a:ext cx="4400436" cy="4351338"/>
+            <a:off x="4114628" y="2225680"/>
+            <a:ext cx="3962743" cy="3551228"/>
           </a:xfrm>
         </p:spPr>
       </p:pic>

</xml_diff>